<commit_message>
solution of first assignment
</commit_message>
<xml_diff>
--- a/Tutorial_material/20190927/20190927.pptx
+++ b/Tutorial_material/20190927/20190927.pptx
@@ -246,7 +246,7 @@
           <a:p>
             <a:fld id="{63A1C593-65D0-4073-BCC9-577B9352EA97}" type="datetimeFigureOut">
               <a:rPr lang="en-US" smtClean="0"/>
-              <a:t>9/25/2019</a:t>
+              <a:t>9/27/2019</a:t>
             </a:fld>
             <a:endParaRPr lang="en-US"/>
           </a:p>
@@ -414,7 +414,7 @@
           <a:p>
             <a:fld id="{63A1C593-65D0-4073-BCC9-577B9352EA97}" type="datetimeFigureOut">
               <a:rPr lang="en-US" smtClean="0"/>
-              <a:t>9/25/2019</a:t>
+              <a:t>9/27/2019</a:t>
             </a:fld>
             <a:endParaRPr lang="en-US"/>
           </a:p>
@@ -592,7 +592,7 @@
           <a:p>
             <a:fld id="{63A1C593-65D0-4073-BCC9-577B9352EA97}" type="datetimeFigureOut">
               <a:rPr lang="en-US" smtClean="0"/>
-              <a:t>9/25/2019</a:t>
+              <a:t>9/27/2019</a:t>
             </a:fld>
             <a:endParaRPr lang="en-US"/>
           </a:p>
@@ -760,7 +760,7 @@
           <a:p>
             <a:fld id="{63A1C593-65D0-4073-BCC9-577B9352EA97}" type="datetimeFigureOut">
               <a:rPr lang="en-US" smtClean="0"/>
-              <a:t>9/25/2019</a:t>
+              <a:t>9/27/2019</a:t>
             </a:fld>
             <a:endParaRPr lang="en-US"/>
           </a:p>
@@ -1005,7 +1005,7 @@
           <a:p>
             <a:fld id="{63A1C593-65D0-4073-BCC9-577B9352EA97}" type="datetimeFigureOut">
               <a:rPr lang="en-US" smtClean="0"/>
-              <a:t>9/25/2019</a:t>
+              <a:t>9/27/2019</a:t>
             </a:fld>
             <a:endParaRPr lang="en-US"/>
           </a:p>
@@ -1234,7 +1234,7 @@
           <a:p>
             <a:fld id="{63A1C593-65D0-4073-BCC9-577B9352EA97}" type="datetimeFigureOut">
               <a:rPr lang="en-US" smtClean="0"/>
-              <a:t>9/25/2019</a:t>
+              <a:t>9/27/2019</a:t>
             </a:fld>
             <a:endParaRPr lang="en-US"/>
           </a:p>
@@ -1598,7 +1598,7 @@
           <a:p>
             <a:fld id="{63A1C593-65D0-4073-BCC9-577B9352EA97}" type="datetimeFigureOut">
               <a:rPr lang="en-US" smtClean="0"/>
-              <a:t>9/25/2019</a:t>
+              <a:t>9/27/2019</a:t>
             </a:fld>
             <a:endParaRPr lang="en-US"/>
           </a:p>
@@ -1715,7 +1715,7 @@
           <a:p>
             <a:fld id="{63A1C593-65D0-4073-BCC9-577B9352EA97}" type="datetimeFigureOut">
               <a:rPr lang="en-US" smtClean="0"/>
-              <a:t>9/25/2019</a:t>
+              <a:t>9/27/2019</a:t>
             </a:fld>
             <a:endParaRPr lang="en-US"/>
           </a:p>
@@ -1810,7 +1810,7 @@
           <a:p>
             <a:fld id="{63A1C593-65D0-4073-BCC9-577B9352EA97}" type="datetimeFigureOut">
               <a:rPr lang="en-US" smtClean="0"/>
-              <a:t>9/25/2019</a:t>
+              <a:t>9/27/2019</a:t>
             </a:fld>
             <a:endParaRPr lang="en-US"/>
           </a:p>
@@ -2085,7 +2085,7 @@
           <a:p>
             <a:fld id="{63A1C593-65D0-4073-BCC9-577B9352EA97}" type="datetimeFigureOut">
               <a:rPr lang="en-US" smtClean="0"/>
-              <a:t>9/25/2019</a:t>
+              <a:t>9/27/2019</a:t>
             </a:fld>
             <a:endParaRPr lang="en-US"/>
           </a:p>
@@ -2337,7 +2337,7 @@
           <a:p>
             <a:fld id="{63A1C593-65D0-4073-BCC9-577B9352EA97}" type="datetimeFigureOut">
               <a:rPr lang="en-US" smtClean="0"/>
-              <a:t>9/25/2019</a:t>
+              <a:t>9/27/2019</a:t>
             </a:fld>
             <a:endParaRPr lang="en-US"/>
           </a:p>
@@ -2548,7 +2548,7 @@
           <a:p>
             <a:fld id="{63A1C593-65D0-4073-BCC9-577B9352EA97}" type="datetimeFigureOut">
               <a:rPr lang="en-US" smtClean="0"/>
-              <a:t>9/25/2019</a:t>
+              <a:t>9/27/2019</a:t>
             </a:fld>
             <a:endParaRPr lang="en-US"/>
           </a:p>
@@ -3136,8 +3136,8 @@
           </a:p>
         </p:txBody>
       </p:sp>
-      <mc:AlternateContent xmlns:mc="http://schemas.openxmlformats.org/markup-compatibility/2006">
-        <mc:Choice xmlns:a14="http://schemas.microsoft.com/office/drawing/2010/main" Requires="a14">
+      <mc:AlternateContent xmlns:mc="http://schemas.openxmlformats.org/markup-compatibility/2006" xmlns:a14="http://schemas.microsoft.com/office/drawing/2010/main">
+        <mc:Choice Requires="a14">
           <p:sp>
             <p:nvSpPr>
               <p:cNvPr id="4" name="文本框 3">
@@ -3553,7 +3553,6 @@
                 </a:r>
               </a:p>
               <a:p>
-                <a:pPr/>
                 <a:endParaRPr lang="en-US" altLang="zh-CN" sz="2800" dirty="0"/>
               </a:p>
               <a:p>
@@ -3565,7 +3564,7 @@
             </p:txBody>
           </p:sp>
         </mc:Choice>
-        <mc:Fallback>
+        <mc:Fallback xmlns="">
           <p:sp>
             <p:nvSpPr>
               <p:cNvPr id="4" name="文本框 3">
@@ -3610,8 +3609,8 @@
           </p:sp>
         </mc:Fallback>
       </mc:AlternateContent>
-      <mc:AlternateContent xmlns:mc="http://schemas.openxmlformats.org/markup-compatibility/2006">
-        <mc:Choice xmlns:a14="http://schemas.microsoft.com/office/drawing/2010/main" Requires="a14">
+      <mc:AlternateContent xmlns:mc="http://schemas.openxmlformats.org/markup-compatibility/2006" xmlns:a14="http://schemas.microsoft.com/office/drawing/2010/main">
+        <mc:Choice Requires="a14">
           <p:sp>
             <p:nvSpPr>
               <p:cNvPr id="6" name="文本框 5">
@@ -4127,7 +4126,6 @@
                 </a:r>
               </a:p>
               <a:p>
-                <a:pPr/>
                 <a:endParaRPr lang="en-US" altLang="zh-CN" sz="2800" dirty="0"/>
               </a:p>
               <a:p>
@@ -4139,7 +4137,7 @@
             </p:txBody>
           </p:sp>
         </mc:Choice>
-        <mc:Fallback>
+        <mc:Fallback xmlns="">
           <p:sp>
             <p:nvSpPr>
               <p:cNvPr id="6" name="文本框 5">
@@ -4243,8 +4241,8 @@
           </a:p>
         </p:txBody>
       </p:sp>
-      <mc:AlternateContent xmlns:mc="http://schemas.openxmlformats.org/markup-compatibility/2006">
-        <mc:Choice xmlns:a14="http://schemas.microsoft.com/office/drawing/2010/main" Requires="a14">
+      <mc:AlternateContent xmlns:mc="http://schemas.openxmlformats.org/markup-compatibility/2006" xmlns:a14="http://schemas.microsoft.com/office/drawing/2010/main">
+        <mc:Choice Requires="a14">
           <p:sp>
             <p:nvSpPr>
               <p:cNvPr id="4" name="矩形 3">
@@ -4375,7 +4373,7 @@
             </p:txBody>
           </p:sp>
         </mc:Choice>
-        <mc:Fallback>
+        <mc:Fallback xmlns="">
           <p:sp>
             <p:nvSpPr>
               <p:cNvPr id="4" name="矩形 3">
@@ -4607,7 +4605,7 @@
                 <a:latin typeface="Times New Roman" pitchFamily="18" charset="0"/>
                 <a:cs typeface="Times New Roman" pitchFamily="18" charset="0"/>
               </a:rPr>
-              <a:t>Lagrangian</a:t>
+              <a:t>Lagarangian</a:t>
             </a:r>
             <a:r>
               <a:rPr lang="en-US" altLang="zh-CN" sz="3200" dirty="0">
@@ -4652,7 +4650,7 @@
         </p:blipFill>
         <p:spPr bwMode="auto">
           <a:xfrm>
-            <a:off x="789920" y="2964656"/>
+            <a:off x="838200" y="2964656"/>
             <a:ext cx="8686800" cy="928688"/>
           </a:xfrm>
           <a:prstGeom prst="rect">
@@ -4751,7 +4749,7 @@
         </p:blipFill>
         <p:spPr>
           <a:xfrm>
-            <a:off x="5543550" y="787398"/>
+            <a:off x="5602878" y="787398"/>
             <a:ext cx="6648450" cy="4457700"/>
           </a:xfrm>
           <a:prstGeom prst="rect">

</xml_diff>